<commit_message>
push remaining files to repo
</commit_message>
<xml_diff>
--- a/Climate Change and It's effect on Crop yeild/Climate change and its effect on crop yield.pptx
+++ b/Climate Change and It's effect on Crop yeild/Climate change and its effect on crop yield.pptx
@@ -9069,7 +9069,7 @@
                 <a:latin typeface="Calibri" panose="020F0502020204030204" pitchFamily="34" charset="0"/>
                 <a:cs typeface="Calibri" panose="020F0502020204030204" pitchFamily="34" charset="0"/>
               </a:rPr>
-              <a:t>Through the visual analysis of the crop yield gap over the stipulated period, it has been shown that Nigeria and Ghana are the largest producing crop countries between the year 2010 to 2018, producing thrice as much as the least producing country. Kenya is the next producing country. However, production is gradually declining over the years and sparing remained constant.</a:t>
+              <a:t>Through the visual analysis of the crop yield gap over the stipulated period, it has been shown that Nigeria and Ghana are the largest producing crop countries between the year 2010 to 2018, producing thrice as much as the least producing country. Kenya is the next producing country. However, production is gradually declining over the years and sparingly remained constant.</a:t>
             </a:r>
           </a:p>
           <a:p>
@@ -10140,7 +10140,7 @@
                 <a:latin typeface="Calibri" panose="020F0502020204030204" pitchFamily="34" charset="0"/>
                 <a:cs typeface="Calibri" panose="020F0502020204030204" pitchFamily="34" charset="0"/>
               </a:rPr>
-              <a:t>However, South Africa, the least crop producing country is seen to be the coolest country as it’s temperature is within 18</a:t>
+              <a:t>However, South Africa, the least crop producing country is seen to be the coolest country as its temperature is within 18</a:t>
             </a:r>
             <a:r>
               <a:rPr lang="en-GB" sz="2400" baseline="30000" dirty="0">
@@ -13836,7 +13836,7 @@
                 <a:latin typeface="Calibri" panose="020F0502020204030204" pitchFamily="34" charset="0"/>
                 <a:cs typeface="Calibri" panose="020F0502020204030204" pitchFamily="34" charset="0"/>
               </a:rPr>
-              <a:t>With visual analysis of  crop production between the year 2010 to 2018 and climate change (rainfall and temperature), it has been observed that climate indeed influence yield gap and is statistically significant to the crop production. Also, it is shown that </a:t>
+              <a:t>With visual analysis of  crop production and climate change (rainfall and temperature) over a period of 8 years, it has been observed that climate indeed influence yield gap and is statistically significant to the crop production. Also, it is shown that </a:t>
             </a:r>
             <a:r>
               <a:rPr lang="en-GB" sz="2400" b="0" i="0" cap="none" dirty="0">
@@ -13871,7 +13871,7 @@
                 <a:ea typeface="Calibri" panose="020F0502020204030204" pitchFamily="34" charset="0"/>
                 <a:cs typeface="Calibri" panose="020F0502020204030204" pitchFamily="34" charset="0"/>
               </a:rPr>
-              <a:t>c</a:t>
+              <a:t>C</a:t>
             </a:r>
             <a:r>
               <a:rPr lang="en-GB" sz="2400" cap="none" dirty="0">
@@ -13887,14 +13887,14 @@
                 <a:latin typeface="Calibri" panose="020F0502020204030204" pitchFamily="34" charset="0"/>
                 <a:cs typeface="Calibri" panose="020F0502020204030204" pitchFamily="34" charset="0"/>
               </a:rPr>
-              <a:t>temperature, at this temperature, countries have a lower yield gap</a:t>
+              <a:t>temperature, at this temperature, countries had a lower yield gap</a:t>
             </a:r>
             <a:r>
               <a:rPr lang="en-GB" sz="2400" cap="none" dirty="0">
                 <a:latin typeface="Calibri" panose="020F0502020204030204" pitchFamily="34" charset="0"/>
                 <a:cs typeface="Calibri" panose="020F0502020204030204" pitchFamily="34" charset="0"/>
               </a:rPr>
-              <a:t> and as such produces more crop production for consumption. </a:t>
+              <a:t> and as such produced more crop for consumption. </a:t>
             </a:r>
             <a:r>
               <a:rPr lang="en-GB" sz="2400" b="0" i="0" cap="none" dirty="0">
@@ -13902,7 +13902,7 @@
                 <a:latin typeface="Calibri" panose="020F0502020204030204" pitchFamily="34" charset="0"/>
                 <a:cs typeface="Calibri" panose="020F0502020204030204" pitchFamily="34" charset="0"/>
               </a:rPr>
-              <a:t>However, global warming increases daily and with time it is possible this optimal conditions for crop growth may not be achieved.</a:t>
+              <a:t>However, global warming increases daily and with time, it is possible that optimal conditions for crop growth may not be achieved.</a:t>
             </a:r>
           </a:p>
         </p:txBody>
@@ -14158,7 +14158,7 @@
                 <a:latin typeface="Calibri" panose="020F0502020204030204" pitchFamily="34" charset="0"/>
                 <a:cs typeface="Calibri" panose="020F0502020204030204" pitchFamily="34" charset="0"/>
               </a:rPr>
-              <a:t>Based on our findings, to a very large extent, climate change affects crop production and the yield gap annually. However, some crops like sugarcane are still favoured by climate change.</a:t>
+              <a:t>Based on our findings, to a very large extent, climate change affect crop production and the yield gap annually. However, some crops like sugarcane are still favoured by climate change.</a:t>
             </a:r>
             <a:endParaRPr lang="aa-ET" sz="2400" cap="none" dirty="0">
               <a:latin typeface="Calibri" panose="020F0502020204030204" pitchFamily="34" charset="0"/>
@@ -14345,7 +14345,7 @@
                 <a:latin typeface="Calibri" panose="020F0502020204030204" pitchFamily="34" charset="0"/>
                 <a:cs typeface="Calibri" panose="020F0502020204030204" pitchFamily="34" charset="0"/>
               </a:rPr>
-              <a:t>E.G. </a:t>
+              <a:t>E.g. </a:t>
             </a:r>
             <a:r>
               <a:rPr lang="en-GB" sz="2400" b="0" i="0" cap="none" dirty="0">
@@ -15108,8 +15108,8 @@
         </p:nvSpPr>
         <p:spPr>
           <a:xfrm>
-            <a:off x="594462" y="1664645"/>
-            <a:ext cx="6778171" cy="4907326"/>
+            <a:off x="330744" y="1343627"/>
+            <a:ext cx="7286013" cy="5066900"/>
           </a:xfrm>
         </p:spPr>
         <p:txBody>
@@ -15206,7 +15206,7 @@
                 <a:ea typeface="Calibri" panose="020F0502020204030204" pitchFamily="34" charset="0"/>
                 <a:cs typeface="Calibri" panose="020F0502020204030204" pitchFamily="34" charset="0"/>
               </a:rPr>
-              <a:t>C by the end of this century. </a:t>
+              <a:t>C by the end of this century. Global warming is caused by the emission of greenhouse gases like carbon</a:t>
             </a:r>
             <a:endParaRPr lang="en-GB" sz="2400" cap="none" dirty="0">
               <a:effectLst/>
@@ -15638,8 +15638,8 @@
         </p:nvSpPr>
         <p:spPr>
           <a:xfrm>
-            <a:off x="433906" y="466240"/>
-            <a:ext cx="7474677" cy="6041561"/>
+            <a:off x="719852" y="1030447"/>
+            <a:ext cx="7188731" cy="5136892"/>
           </a:xfrm>
         </p:spPr>
         <p:txBody>
@@ -15662,7 +15662,7 @@
                 <a:ea typeface="Calibri" panose="020F0502020204030204" pitchFamily="34" charset="0"/>
                 <a:cs typeface="Calibri" panose="020F0502020204030204" pitchFamily="34" charset="0"/>
               </a:rPr>
-              <a:t>Global warming is caused by the emission of greenhouse gases like carbon dioxide, methane, chlorofluorocarbons and nitrous oxide. These gases cause an insulating effect on the climate which causes the atmosphere to trap heat and warm the earth. The actives of these gases on the climate affect the soil which in turns affect crop yield. With the world population expected to hit double by 2050, global food production would have to double to meet the need of the rising population. The threat to food security from climate change is a critical issue for sustainable agriculture and a sufficient number of businesses. Developing countries may be more at risk of food scarcity.</a:t>
+              <a:t>dioxide, methane, chlorofluorocarbons and nitrous oxide. These gases cause an insulating effect on the climate which causes the atmosphere to trap heat and warm the earth. The actives of these gases on the climate affect the soil which in turns affect crop yield. With the world population expected to hit double by 2050, global food production would have to double to meet the need of the rising population. The threat to food security from climate change is a critical issue for sustainable agriculture and a sufficient number of businesses. Developing countries may be more at risk of food scarcity.</a:t>
             </a:r>
             <a:endParaRPr lang="aa-ET" sz="2200" cap="none" dirty="0">
               <a:effectLst/>
@@ -17292,7 +17292,7 @@
                 <a:latin typeface="Calibri" panose="020F0502020204030204" pitchFamily="34" charset="0"/>
                 <a:cs typeface="Calibri" panose="020F0502020204030204" pitchFamily="34" charset="0"/>
               </a:rPr>
-              <a:t>Crop yield gap is the difference between yield potential and average farmers yield over a specified area or period of time i.e. the higher the yield gap the lower the production. Factors that affect crop yield gap include flood, drought caused by climatic changes. </a:t>
+              <a:t>Crop yield gap is the difference between yield potential and average farmers yield over a specified area or period of time i.e. the higher the yield gap the lower the production and vice versa. Factors that affect crop yield gap include flood, drought caused by climatic changes. </a:t>
             </a:r>
             <a:endParaRPr lang="aa-ET" sz="2400" b="1" cap="none" dirty="0">
               <a:latin typeface="Calibri" panose="020F0502020204030204" pitchFamily="34" charset="0"/>

</xml_diff>